<commit_message>
update slides for lecture
</commit_message>
<xml_diff>
--- a/Slides/On-Campus/02_01_turing_expressions_and_functions.pptx
+++ b/Slides/On-Campus/02_01_turing_expressions_and_functions.pptx
@@ -771,6 +771,298 @@
 </p:notes>
 </file>
 
+<file path=ppt/notesSlides/notesSlide10.xml><?xml version="1.0" encoding="utf-8"?>
+<p:notes xmlns:a="http://schemas.openxmlformats.org/drawingml/2006/main" xmlns:r="http://schemas.openxmlformats.org/officeDocument/2006/relationships" xmlns:p="http://schemas.openxmlformats.org/presentationml/2006/main">
+  <p:cSld>
+    <p:spTree>
+      <p:nvGrpSpPr>
+        <p:cNvPr id="1" name=""/>
+        <p:cNvGrpSpPr/>
+        <p:nvPr/>
+      </p:nvGrpSpPr>
+      <p:grpSpPr>
+        <a:xfrm>
+          <a:off x="0" y="0"/>
+          <a:ext cx="0" cy="0"/>
+          <a:chOff x="0" y="0"/>
+          <a:chExt cx="0" cy="0"/>
+        </a:xfrm>
+      </p:grpSpPr>
+      <p:sp>
+        <p:nvSpPr>
+          <p:cNvPr id="2" name="Slide Image Placeholder 1"/>
+          <p:cNvSpPr>
+            <a:spLocks noGrp="1" noRot="1" noChangeAspect="1"/>
+          </p:cNvSpPr>
+          <p:nvPr>
+            <p:ph type="sldImg"/>
+          </p:nvPr>
+        </p:nvSpPr>
+        <p:spPr/>
+      </p:sp>
+      <p:sp>
+        <p:nvSpPr>
+          <p:cNvPr id="3" name="Notes Placeholder 2"/>
+          <p:cNvSpPr>
+            <a:spLocks noGrp="1"/>
+          </p:cNvSpPr>
+          <p:nvPr>
+            <p:ph type="body" idx="1"/>
+          </p:nvPr>
+        </p:nvSpPr>
+        <p:spPr/>
+        <p:txBody>
+          <a:bodyPr/>
+          <a:lstStyle/>
+          <a:p>
+            <a:endParaRPr lang="en-US" dirty="0"/>
+          </a:p>
+        </p:txBody>
+      </p:sp>
+      <p:sp>
+        <p:nvSpPr>
+          <p:cNvPr id="4" name="Slide Number Placeholder 3"/>
+          <p:cNvSpPr>
+            <a:spLocks noGrp="1"/>
+          </p:cNvSpPr>
+          <p:nvPr>
+            <p:ph type="sldNum" sz="quarter" idx="5"/>
+          </p:nvPr>
+        </p:nvSpPr>
+        <p:spPr/>
+        <p:txBody>
+          <a:bodyPr/>
+          <a:lstStyle/>
+          <a:p>
+            <a:fld id="{1A032F50-0B60-B34B-8422-4E195A5AE2C1}" type="slidenum">
+              <a:rPr lang="en-US" smtClean="0"/>
+              <a:t>14</a:t>
+            </a:fld>
+            <a:endParaRPr lang="en-US"/>
+          </a:p>
+        </p:txBody>
+      </p:sp>
+    </p:spTree>
+    <p:extLst>
+      <p:ext uri="{BB962C8B-B14F-4D97-AF65-F5344CB8AC3E}">
+        <p14:creationId xmlns:p14="http://schemas.microsoft.com/office/powerpoint/2010/main" val="2195303885"/>
+      </p:ext>
+    </p:extLst>
+  </p:cSld>
+  <p:clrMapOvr>
+    <a:masterClrMapping/>
+  </p:clrMapOvr>
+</p:notes>
+</file>
+
+<file path=ppt/notesSlides/notesSlide11.xml><?xml version="1.0" encoding="utf-8"?>
+<p:notes xmlns:a="http://schemas.openxmlformats.org/drawingml/2006/main" xmlns:r="http://schemas.openxmlformats.org/officeDocument/2006/relationships" xmlns:p="http://schemas.openxmlformats.org/presentationml/2006/main" showMasterSp="0" showMasterPhAnim="0">
+  <p:cSld>
+    <p:spTree>
+      <p:nvGrpSpPr>
+        <p:cNvPr id="1" name="Shape 188"/>
+        <p:cNvGrpSpPr/>
+        <p:nvPr/>
+      </p:nvGrpSpPr>
+      <p:grpSpPr>
+        <a:xfrm>
+          <a:off x="0" y="0"/>
+          <a:ext cx="0" cy="0"/>
+          <a:chOff x="0" y="0"/>
+          <a:chExt cx="0" cy="0"/>
+        </a:xfrm>
+      </p:grpSpPr>
+      <p:sp>
+        <p:nvSpPr>
+          <p:cNvPr id="189" name="Google Shape;189;g6e361b03c5_0_0:notes"/>
+          <p:cNvSpPr>
+            <a:spLocks noGrp="1" noRot="1" noChangeAspect="1"/>
+          </p:cNvSpPr>
+          <p:nvPr>
+            <p:ph type="sldImg" idx="2"/>
+          </p:nvPr>
+        </p:nvSpPr>
+        <p:spPr>
+          <a:xfrm>
+            <a:off x="381000" y="685800"/>
+            <a:ext cx="6096000" cy="3429000"/>
+          </a:xfrm>
+          <a:custGeom>
+            <a:avLst/>
+            <a:gdLst/>
+            <a:ahLst/>
+            <a:cxnLst/>
+            <a:rect l="l" t="t" r="r" b="b"/>
+            <a:pathLst>
+              <a:path w="120000" h="120000" extrusionOk="0">
+                <a:moveTo>
+                  <a:pt x="0" y="0"/>
+                </a:moveTo>
+                <a:lnTo>
+                  <a:pt x="120000" y="0"/>
+                </a:lnTo>
+                <a:lnTo>
+                  <a:pt x="120000" y="120000"/>
+                </a:lnTo>
+                <a:lnTo>
+                  <a:pt x="0" y="120000"/>
+                </a:lnTo>
+                <a:close/>
+              </a:path>
+            </a:pathLst>
+          </a:custGeom>
+        </p:spPr>
+      </p:sp>
+      <p:sp>
+        <p:nvSpPr>
+          <p:cNvPr id="190" name="Google Shape;190;g6e361b03c5_0_0:notes"/>
+          <p:cNvSpPr txBox="1">
+            <a:spLocks noGrp="1"/>
+          </p:cNvSpPr>
+          <p:nvPr>
+            <p:ph type="body" idx="1"/>
+          </p:nvPr>
+        </p:nvSpPr>
+        <p:spPr>
+          <a:xfrm>
+            <a:off x="685800" y="4343400"/>
+            <a:ext cx="5486400" cy="4114800"/>
+          </a:xfrm>
+          <a:prstGeom prst="rect">
+            <a:avLst/>
+          </a:prstGeom>
+        </p:spPr>
+        <p:txBody>
+          <a:bodyPr spcFirstLastPara="1" wrap="square" lIns="91425" tIns="91425" rIns="91425" bIns="91425" anchor="t" anchorCtr="0">
+            <a:noAutofit/>
+          </a:bodyPr>
+          <a:lstStyle/>
+          <a:p>
+            <a:pPr marL="0" lvl="0" indent="0" algn="l" rtl="0">
+              <a:spcBef>
+                <a:spcPts val="0"/>
+              </a:spcBef>
+              <a:spcAft>
+                <a:spcPts val="0"/>
+              </a:spcAft>
+              <a:buNone/>
+            </a:pPr>
+            <a:endParaRPr dirty="0"/>
+          </a:p>
+        </p:txBody>
+      </p:sp>
+    </p:spTree>
+  </p:cSld>
+  <p:clrMapOvr>
+    <a:masterClrMapping/>
+  </p:clrMapOvr>
+</p:notes>
+</file>
+
+<file path=ppt/notesSlides/notesSlide12.xml><?xml version="1.0" encoding="utf-8"?>
+<p:notes xmlns:a="http://schemas.openxmlformats.org/drawingml/2006/main" xmlns:r="http://schemas.openxmlformats.org/officeDocument/2006/relationships" xmlns:p="http://schemas.openxmlformats.org/presentationml/2006/main" showMasterSp="0" showMasterPhAnim="0">
+  <p:cSld>
+    <p:spTree>
+      <p:nvGrpSpPr>
+        <p:cNvPr id="1" name="Shape 224"/>
+        <p:cNvGrpSpPr/>
+        <p:nvPr/>
+      </p:nvGrpSpPr>
+      <p:grpSpPr>
+        <a:xfrm>
+          <a:off x="0" y="0"/>
+          <a:ext cx="0" cy="0"/>
+          <a:chOff x="0" y="0"/>
+          <a:chExt cx="0" cy="0"/>
+        </a:xfrm>
+      </p:grpSpPr>
+      <p:sp>
+        <p:nvSpPr>
+          <p:cNvPr id="225" name="Google Shape;225;g6e361b03c5_0_42:notes"/>
+          <p:cNvSpPr>
+            <a:spLocks noGrp="1" noRot="1" noChangeAspect="1"/>
+          </p:cNvSpPr>
+          <p:nvPr>
+            <p:ph type="sldImg" idx="2"/>
+          </p:nvPr>
+        </p:nvSpPr>
+        <p:spPr>
+          <a:xfrm>
+            <a:off x="381000" y="685800"/>
+            <a:ext cx="6096000" cy="3429000"/>
+          </a:xfrm>
+          <a:custGeom>
+            <a:avLst/>
+            <a:gdLst/>
+            <a:ahLst/>
+            <a:cxnLst/>
+            <a:rect l="l" t="t" r="r" b="b"/>
+            <a:pathLst>
+              <a:path w="120000" h="120000" extrusionOk="0">
+                <a:moveTo>
+                  <a:pt x="0" y="0"/>
+                </a:moveTo>
+                <a:lnTo>
+                  <a:pt x="120000" y="0"/>
+                </a:lnTo>
+                <a:lnTo>
+                  <a:pt x="120000" y="120000"/>
+                </a:lnTo>
+                <a:lnTo>
+                  <a:pt x="0" y="120000"/>
+                </a:lnTo>
+                <a:close/>
+              </a:path>
+            </a:pathLst>
+          </a:custGeom>
+        </p:spPr>
+      </p:sp>
+      <p:sp>
+        <p:nvSpPr>
+          <p:cNvPr id="226" name="Google Shape;226;g6e361b03c5_0_42:notes"/>
+          <p:cNvSpPr txBox="1">
+            <a:spLocks noGrp="1"/>
+          </p:cNvSpPr>
+          <p:nvPr>
+            <p:ph type="body" idx="1"/>
+          </p:nvPr>
+        </p:nvSpPr>
+        <p:spPr>
+          <a:xfrm>
+            <a:off x="685800" y="4343400"/>
+            <a:ext cx="5486400" cy="4114800"/>
+          </a:xfrm>
+          <a:prstGeom prst="rect">
+            <a:avLst/>
+          </a:prstGeom>
+        </p:spPr>
+        <p:txBody>
+          <a:bodyPr spcFirstLastPara="1" wrap="square" lIns="91425" tIns="91425" rIns="91425" bIns="91425" anchor="t" anchorCtr="0">
+            <a:noAutofit/>
+          </a:bodyPr>
+          <a:lstStyle/>
+          <a:p>
+            <a:pPr marL="0" lvl="0" indent="0" algn="l" rtl="0">
+              <a:spcBef>
+                <a:spcPts val="0"/>
+              </a:spcBef>
+              <a:spcAft>
+                <a:spcPts val="0"/>
+              </a:spcAft>
+              <a:buNone/>
+            </a:pPr>
+            <a:endParaRPr dirty="0"/>
+          </a:p>
+        </p:txBody>
+      </p:sp>
+    </p:spTree>
+  </p:cSld>
+  <p:clrMapOvr>
+    <a:masterClrMapping/>
+  </p:clrMapOvr>
+</p:notes>
+</file>
+
 <file path=ppt/notesSlides/notesSlide2.xml><?xml version="1.0" encoding="utf-8"?>
 <p:notes xmlns:a="http://schemas.openxmlformats.org/drawingml/2006/main" xmlns:r="http://schemas.openxmlformats.org/officeDocument/2006/relationships" xmlns:p="http://schemas.openxmlformats.org/presentationml/2006/main" showMasterSp="0" showMasterPhAnim="0">
   <p:cSld>
@@ -1396,11 +1688,11 @@
 </file>
 
 <file path=ppt/notesSlides/notesSlide8.xml><?xml version="1.0" encoding="utf-8"?>
-<p:notes xmlns:a="http://schemas.openxmlformats.org/drawingml/2006/main" xmlns:r="http://schemas.openxmlformats.org/officeDocument/2006/relationships" xmlns:p="http://schemas.openxmlformats.org/presentationml/2006/main" showMasterSp="0" showMasterPhAnim="0">
+<p:notes xmlns:a="http://schemas.openxmlformats.org/drawingml/2006/main" xmlns:r="http://schemas.openxmlformats.org/officeDocument/2006/relationships" xmlns:p="http://schemas.openxmlformats.org/presentationml/2006/main">
   <p:cSld>
     <p:spTree>
       <p:nvGrpSpPr>
-        <p:cNvPr id="1" name="Shape 188"/>
+        <p:cNvPr id="1" name=""/>
         <p:cNvGrpSpPr/>
         <p:nvPr/>
       </p:nvGrpSpPr>
@@ -1414,84 +1706,64 @@
       </p:grpSpPr>
       <p:sp>
         <p:nvSpPr>
-          <p:cNvPr id="189" name="Google Shape;189;g6e361b03c5_0_0:notes"/>
+          <p:cNvPr id="2" name="Slide Image Placeholder 1"/>
           <p:cNvSpPr>
             <a:spLocks noGrp="1" noRot="1" noChangeAspect="1"/>
           </p:cNvSpPr>
           <p:nvPr>
-            <p:ph type="sldImg" idx="2"/>
+            <p:ph type="sldImg"/>
           </p:nvPr>
         </p:nvSpPr>
-        <p:spPr>
-          <a:xfrm>
-            <a:off x="381000" y="685800"/>
-            <a:ext cx="6096000" cy="3429000"/>
-          </a:xfrm>
-          <a:custGeom>
-            <a:avLst/>
-            <a:gdLst/>
-            <a:ahLst/>
-            <a:cxnLst/>
-            <a:rect l="l" t="t" r="r" b="b"/>
-            <a:pathLst>
-              <a:path w="120000" h="120000" extrusionOk="0">
-                <a:moveTo>
-                  <a:pt x="0" y="0"/>
-                </a:moveTo>
-                <a:lnTo>
-                  <a:pt x="120000" y="0"/>
-                </a:lnTo>
-                <a:lnTo>
-                  <a:pt x="120000" y="120000"/>
-                </a:lnTo>
-                <a:lnTo>
-                  <a:pt x="0" y="120000"/>
-                </a:lnTo>
-                <a:close/>
-              </a:path>
-            </a:pathLst>
-          </a:custGeom>
-        </p:spPr>
+        <p:spPr/>
       </p:sp>
       <p:sp>
         <p:nvSpPr>
-          <p:cNvPr id="190" name="Google Shape;190;g6e361b03c5_0_0:notes"/>
-          <p:cNvSpPr txBox="1">
+          <p:cNvPr id="3" name="Notes Placeholder 2"/>
+          <p:cNvSpPr>
             <a:spLocks noGrp="1"/>
           </p:cNvSpPr>
           <p:nvPr>
             <p:ph type="body" idx="1"/>
           </p:nvPr>
         </p:nvSpPr>
-        <p:spPr>
-          <a:xfrm>
-            <a:off x="685800" y="4343400"/>
-            <a:ext cx="5486400" cy="4114800"/>
-          </a:xfrm>
-          <a:prstGeom prst="rect">
-            <a:avLst/>
-          </a:prstGeom>
-        </p:spPr>
+        <p:spPr/>
         <p:txBody>
-          <a:bodyPr spcFirstLastPara="1" wrap="square" lIns="91425" tIns="91425" rIns="91425" bIns="91425" anchor="t" anchorCtr="0">
-            <a:noAutofit/>
-          </a:bodyPr>
+          <a:bodyPr/>
           <a:lstStyle/>
           <a:p>
-            <a:pPr marL="0" lvl="0" indent="0" algn="l" rtl="0">
-              <a:spcBef>
-                <a:spcPts val="0"/>
-              </a:spcBef>
-              <a:spcAft>
-                <a:spcPts val="0"/>
-              </a:spcAft>
-              <a:buNone/>
-            </a:pPr>
-            <a:endParaRPr dirty="0"/>
+            <a:endParaRPr lang="en-US" dirty="0"/>
+          </a:p>
+        </p:txBody>
+      </p:sp>
+      <p:sp>
+        <p:nvSpPr>
+          <p:cNvPr id="4" name="Slide Number Placeholder 3"/>
+          <p:cNvSpPr>
+            <a:spLocks noGrp="1"/>
+          </p:cNvSpPr>
+          <p:nvPr>
+            <p:ph type="sldNum" sz="quarter" idx="5"/>
+          </p:nvPr>
+        </p:nvSpPr>
+        <p:spPr/>
+        <p:txBody>
+          <a:bodyPr/>
+          <a:lstStyle/>
+          <a:p>
+            <a:fld id="{1A032F50-0B60-B34B-8422-4E195A5AE2C1}" type="slidenum">
+              <a:rPr lang="en-US" smtClean="0"/>
+              <a:t>11</a:t>
+            </a:fld>
+            <a:endParaRPr lang="en-US"/>
           </a:p>
         </p:txBody>
       </p:sp>
     </p:spTree>
+    <p:extLst>
+      <p:ext uri="{BB962C8B-B14F-4D97-AF65-F5344CB8AC3E}">
+        <p14:creationId xmlns:p14="http://schemas.microsoft.com/office/powerpoint/2010/main" val="4099541239"/>
+      </p:ext>
+    </p:extLst>
   </p:cSld>
   <p:clrMapOvr>
     <a:masterClrMapping/>
@@ -1500,11 +1772,11 @@
 </file>
 
 <file path=ppt/notesSlides/notesSlide9.xml><?xml version="1.0" encoding="utf-8"?>
-<p:notes xmlns:a="http://schemas.openxmlformats.org/drawingml/2006/main" xmlns:r="http://schemas.openxmlformats.org/officeDocument/2006/relationships" xmlns:p="http://schemas.openxmlformats.org/presentationml/2006/main" showMasterSp="0" showMasterPhAnim="0">
+<p:notes xmlns:a="http://schemas.openxmlformats.org/drawingml/2006/main" xmlns:r="http://schemas.openxmlformats.org/officeDocument/2006/relationships" xmlns:p="http://schemas.openxmlformats.org/presentationml/2006/main">
   <p:cSld>
     <p:spTree>
       <p:nvGrpSpPr>
-        <p:cNvPr id="1" name="Shape 224"/>
+        <p:cNvPr id="1" name=""/>
         <p:cNvGrpSpPr/>
         <p:nvPr/>
       </p:nvGrpSpPr>
@@ -1518,84 +1790,64 @@
       </p:grpSpPr>
       <p:sp>
         <p:nvSpPr>
-          <p:cNvPr id="225" name="Google Shape;225;g6e361b03c5_0_42:notes"/>
+          <p:cNvPr id="2" name="Slide Image Placeholder 1"/>
           <p:cNvSpPr>
             <a:spLocks noGrp="1" noRot="1" noChangeAspect="1"/>
           </p:cNvSpPr>
           <p:nvPr>
-            <p:ph type="sldImg" idx="2"/>
+            <p:ph type="sldImg"/>
           </p:nvPr>
         </p:nvSpPr>
-        <p:spPr>
-          <a:xfrm>
-            <a:off x="381000" y="685800"/>
-            <a:ext cx="6096000" cy="3429000"/>
-          </a:xfrm>
-          <a:custGeom>
-            <a:avLst/>
-            <a:gdLst/>
-            <a:ahLst/>
-            <a:cxnLst/>
-            <a:rect l="l" t="t" r="r" b="b"/>
-            <a:pathLst>
-              <a:path w="120000" h="120000" extrusionOk="0">
-                <a:moveTo>
-                  <a:pt x="0" y="0"/>
-                </a:moveTo>
-                <a:lnTo>
-                  <a:pt x="120000" y="0"/>
-                </a:lnTo>
-                <a:lnTo>
-                  <a:pt x="120000" y="120000"/>
-                </a:lnTo>
-                <a:lnTo>
-                  <a:pt x="0" y="120000"/>
-                </a:lnTo>
-                <a:close/>
-              </a:path>
-            </a:pathLst>
-          </a:custGeom>
-        </p:spPr>
+        <p:spPr/>
       </p:sp>
       <p:sp>
         <p:nvSpPr>
-          <p:cNvPr id="226" name="Google Shape;226;g6e361b03c5_0_42:notes"/>
-          <p:cNvSpPr txBox="1">
+          <p:cNvPr id="3" name="Notes Placeholder 2"/>
+          <p:cNvSpPr>
             <a:spLocks noGrp="1"/>
           </p:cNvSpPr>
           <p:nvPr>
             <p:ph type="body" idx="1"/>
           </p:nvPr>
         </p:nvSpPr>
-        <p:spPr>
-          <a:xfrm>
-            <a:off x="685800" y="4343400"/>
-            <a:ext cx="5486400" cy="4114800"/>
-          </a:xfrm>
-          <a:prstGeom prst="rect">
-            <a:avLst/>
-          </a:prstGeom>
-        </p:spPr>
+        <p:spPr/>
         <p:txBody>
-          <a:bodyPr spcFirstLastPara="1" wrap="square" lIns="91425" tIns="91425" rIns="91425" bIns="91425" anchor="t" anchorCtr="0">
-            <a:noAutofit/>
-          </a:bodyPr>
+          <a:bodyPr/>
           <a:lstStyle/>
           <a:p>
-            <a:pPr marL="0" lvl="0" indent="0" algn="l" rtl="0">
-              <a:spcBef>
-                <a:spcPts val="0"/>
-              </a:spcBef>
-              <a:spcAft>
-                <a:spcPts val="0"/>
-              </a:spcAft>
-              <a:buNone/>
-            </a:pPr>
-            <a:endParaRPr dirty="0"/>
+            <a:endParaRPr lang="en-US" dirty="0"/>
+          </a:p>
+        </p:txBody>
+      </p:sp>
+      <p:sp>
+        <p:nvSpPr>
+          <p:cNvPr id="4" name="Slide Number Placeholder 3"/>
+          <p:cNvSpPr>
+            <a:spLocks noGrp="1"/>
+          </p:cNvSpPr>
+          <p:nvPr>
+            <p:ph type="sldNum" sz="quarter" idx="5"/>
+          </p:nvPr>
+        </p:nvSpPr>
+        <p:spPr/>
+        <p:txBody>
+          <a:bodyPr/>
+          <a:lstStyle/>
+          <a:p>
+            <a:fld id="{1A032F50-0B60-B34B-8422-4E195A5AE2C1}" type="slidenum">
+              <a:rPr lang="en-US" smtClean="0"/>
+              <a:t>12</a:t>
+            </a:fld>
+            <a:endParaRPr lang="en-US"/>
           </a:p>
         </p:txBody>
       </p:sp>
     </p:spTree>
+    <p:extLst>
+      <p:ext uri="{BB962C8B-B14F-4D97-AF65-F5344CB8AC3E}">
+        <p14:creationId xmlns:p14="http://schemas.microsoft.com/office/powerpoint/2010/main" val="3850519901"/>
+      </p:ext>
+    </p:extLst>
   </p:cSld>
   <p:clrMapOvr>
     <a:masterClrMapping/>

</xml_diff>